<commit_message>
uploaded grp slides and modified project2 slides
</commit_message>
<xml_diff>
--- a/GA-project2/GA-project2.pptx
+++ b/GA-project2/GA-project2.pptx
@@ -116,6 +116,11 @@
       </a:defRPr>
     </a:lvl9pPr>
   </p:defaultTextStyle>
+  <p:extLst>
+    <p:ext uri="{EFAFB233-063F-42B5-8137-9DF3F51BA10A}">
+      <p15:sldGuideLst xmlns:p15="http://schemas.microsoft.com/office/powerpoint/2012/main"/>
+    </p:ext>
+  </p:extLst>
 </p:presentation>
 </file>
 
@@ -470,6 +475,90 @@
 </file>
 
 <file path=ppt/notesSlides/notesSlide1.xml><?xml version="1.0" encoding="utf-8"?>
+<p:notes xmlns:a="http://schemas.openxmlformats.org/drawingml/2006/main" xmlns:r="http://schemas.openxmlformats.org/officeDocument/2006/relationships" xmlns:p="http://schemas.openxmlformats.org/presentationml/2006/main">
+  <p:cSld>
+    <p:spTree>
+      <p:nvGrpSpPr>
+        <p:cNvPr id="1" name=""/>
+        <p:cNvGrpSpPr/>
+        <p:nvPr/>
+      </p:nvGrpSpPr>
+      <p:grpSpPr>
+        <a:xfrm>
+          <a:off x="0" y="0"/>
+          <a:ext cx="0" cy="0"/>
+          <a:chOff x="0" y="0"/>
+          <a:chExt cx="0" cy="0"/>
+        </a:xfrm>
+      </p:grpSpPr>
+      <p:sp>
+        <p:nvSpPr>
+          <p:cNvPr id="2" name="Slide Image Placeholder 1"/>
+          <p:cNvSpPr>
+            <a:spLocks noGrp="1" noRot="1" noChangeAspect="1"/>
+          </p:cNvSpPr>
+          <p:nvPr>
+            <p:ph type="sldImg"/>
+          </p:nvPr>
+        </p:nvSpPr>
+        <p:spPr/>
+      </p:sp>
+      <p:sp>
+        <p:nvSpPr>
+          <p:cNvPr id="3" name="Notes Placeholder 2"/>
+          <p:cNvSpPr>
+            <a:spLocks noGrp="1"/>
+          </p:cNvSpPr>
+          <p:nvPr>
+            <p:ph type="body" idx="1"/>
+          </p:nvPr>
+        </p:nvSpPr>
+        <p:spPr/>
+        <p:txBody>
+          <a:bodyPr/>
+          <a:lstStyle/>
+          <a:p>
+            <a:endParaRPr lang="en-US" dirty="0"/>
+          </a:p>
+        </p:txBody>
+      </p:sp>
+      <p:sp>
+        <p:nvSpPr>
+          <p:cNvPr id="4" name="Slide Number Placeholder 3"/>
+          <p:cNvSpPr>
+            <a:spLocks noGrp="1"/>
+          </p:cNvSpPr>
+          <p:nvPr>
+            <p:ph type="sldNum" sz="quarter" idx="5"/>
+          </p:nvPr>
+        </p:nvSpPr>
+        <p:spPr/>
+        <p:txBody>
+          <a:bodyPr/>
+          <a:lstStyle/>
+          <a:p>
+            <a:fld id="{8D9A7BA2-93CC-CE46-BD1D-BDD1AB4B84A1}" type="slidenum">
+              <a:rPr lang="en-US" smtClean="0"/>
+              <a:t>5</a:t>
+            </a:fld>
+            <a:endParaRPr lang="en-US"/>
+          </a:p>
+        </p:txBody>
+      </p:sp>
+    </p:spTree>
+    <p:extLst>
+      <p:ext uri="{BB962C8B-B14F-4D97-AF65-F5344CB8AC3E}">
+        <p14:creationId xmlns:p14="http://schemas.microsoft.com/office/powerpoint/2010/main" val="930232765"/>
+      </p:ext>
+    </p:extLst>
+  </p:cSld>
+  <p:clrMapOvr>
+    <a:masterClrMapping/>
+  </p:clrMapOvr>
+</p:notes>
+</file>
+
+<file path=ppt/notesSlides/notesSlide2.xml><?xml version="1.0" encoding="utf-8"?>
 <p:notes xmlns:a="http://schemas.openxmlformats.org/drawingml/2006/main" xmlns:r="http://schemas.openxmlformats.org/officeDocument/2006/relationships" xmlns:p="http://schemas.openxmlformats.org/presentationml/2006/main">
   <p:cSld>
     <p:spTree>
@@ -3939,7 +4028,17 @@
           <a:p>
             <a:r>
               <a:rPr lang="en-US" dirty="0"/>
-              <a:t> With a set of features, the model is able to predict the price of a house</a:t>
+              <a:t>The top 3 features that will influence the price are location of the house, the total area of house and the overall quality of the house</a:t>
+            </a:r>
+          </a:p>
+          <a:p>
+            <a:r>
+              <a:rPr lang="en-US"/>
+              <a:t>With </a:t>
+            </a:r>
+            <a:r>
+              <a:rPr lang="en-US" dirty="0"/>
+              <a:t>a set of features, the model is able to predict the price of a house</a:t>
             </a:r>
           </a:p>
         </p:txBody>
@@ -4034,6 +4133,12 @@
               <a:t>Determine the best regression model for predicting Sale Price with the influential features </a:t>
             </a:r>
           </a:p>
+          <a:p>
+            <a:r>
+              <a:rPr lang="en-US" dirty="0"/>
+              <a:t>With a set of features, we are able to predict the price of a house</a:t>
+            </a:r>
+          </a:p>
         </p:txBody>
       </p:sp>
     </p:spTree>
@@ -4108,7 +4213,7 @@
         </p:nvSpPr>
         <p:spPr>
           <a:xfrm>
-            <a:off x="2177964" y="2749517"/>
+            <a:off x="2017944" y="2749517"/>
             <a:ext cx="1993742" cy="1779234"/>
           </a:xfrm>
           <a:prstGeom prst="ellipse">
@@ -4162,7 +4267,7 @@
         </p:nvSpPr>
         <p:spPr>
           <a:xfrm>
-            <a:off x="2280179" y="3233929"/>
+            <a:off x="2120159" y="3233929"/>
             <a:ext cx="1767016" cy="830997"/>
           </a:xfrm>
           <a:prstGeom prst="rect">
@@ -4198,7 +4303,7 @@
         </p:nvSpPr>
         <p:spPr>
           <a:xfrm>
-            <a:off x="5589555" y="2749517"/>
+            <a:off x="5063775" y="2749517"/>
             <a:ext cx="1993742" cy="1779234"/>
           </a:xfrm>
           <a:prstGeom prst="ellipse">
@@ -4252,8 +4357,8 @@
         </p:nvSpPr>
         <p:spPr>
           <a:xfrm>
-            <a:off x="5729782" y="3266540"/>
-            <a:ext cx="1767016" cy="830997"/>
+            <a:off x="5204002" y="3049370"/>
+            <a:ext cx="1767016" cy="1200329"/>
           </a:xfrm>
           <a:prstGeom prst="rect">
             <a:avLst/>
@@ -4269,7 +4374,7 @@
             <a:pPr algn="ctr"/>
             <a:r>
               <a:rPr lang="en-US" sz="2400" dirty="0"/>
-              <a:t>Feature Selection</a:t>
+              <a:t>Feature Selection using EDA</a:t>
             </a:r>
           </a:p>
         </p:txBody>
@@ -4288,7 +4393,7 @@
         </p:nvSpPr>
         <p:spPr>
           <a:xfrm>
-            <a:off x="8705708" y="2737160"/>
+            <a:off x="8179928" y="2737160"/>
             <a:ext cx="1993742" cy="1779234"/>
           </a:xfrm>
           <a:prstGeom prst="ellipse">
@@ -4342,7 +4447,7 @@
         </p:nvSpPr>
         <p:spPr>
           <a:xfrm>
-            <a:off x="8845935" y="3278900"/>
+            <a:off x="8320155" y="3278900"/>
             <a:ext cx="1767016" cy="830997"/>
           </a:xfrm>
           <a:prstGeom prst="rect">
@@ -4380,7 +4485,7 @@
         </p:nvCxnSpPr>
         <p:spPr>
           <a:xfrm>
-            <a:off x="4600825" y="3639134"/>
+            <a:off x="4075045" y="3639134"/>
             <a:ext cx="896475" cy="0"/>
           </a:xfrm>
           <a:prstGeom prst="straightConnector1">
@@ -4421,7 +4526,7 @@
         </p:nvCxnSpPr>
         <p:spPr>
           <a:xfrm>
-            <a:off x="7702320" y="3630898"/>
+            <a:off x="7176540" y="3630898"/>
             <a:ext cx="896475" cy="0"/>
           </a:xfrm>
           <a:prstGeom prst="straightConnector1">
@@ -4847,7 +4952,7 @@
           <p:nvPr/>
         </p:nvPicPr>
         <p:blipFill>
-          <a:blip r:embed="rId2"/>
+          <a:blip r:embed="rId3"/>
           <a:stretch>
             <a:fillRect/>
           </a:stretch>
@@ -4957,20 +5062,12 @@
               <a:buChar char="•"/>
             </a:pPr>
             <a:r>
-              <a:rPr lang="en-US" dirty="0" err="1">
-                <a:solidFill>
-                  <a:schemeClr val="tx1"/>
-                </a:solidFill>
-              </a:rPr>
-              <a:t>Pairplots</a:t>
-            </a:r>
-            <a:r>
               <a:rPr lang="en-US" dirty="0">
                 <a:solidFill>
                   <a:schemeClr val="tx1"/>
                 </a:solidFill>
               </a:rPr>
-              <a:t> are used to find the correlation between continuous/discrete relationship</a:t>
+              <a:t>Pair plots are used to find the correlation between continuous/discrete relationship</a:t>
             </a:r>
           </a:p>
           <a:p>
@@ -4984,7 +5081,7 @@
                   <a:schemeClr val="tx1"/>
                 </a:solidFill>
               </a:rPr>
-              <a:t> Collinearity between continuous features can be removed</a:t>
+              <a:t>Collinearity between continuous features can be removed</a:t>
             </a:r>
           </a:p>
           <a:p>
@@ -5034,7 +5131,7 @@
           <p:nvPr/>
         </p:nvPicPr>
         <p:blipFill>
-          <a:blip r:embed="rId3"/>
+          <a:blip r:embed="rId4"/>
           <a:stretch>
             <a:fillRect/>
           </a:stretch>
@@ -5334,20 +5431,12 @@
               <a:buChar char="•"/>
             </a:pPr>
             <a:r>
-              <a:rPr lang="en-US" dirty="0" err="1">
-                <a:solidFill>
-                  <a:schemeClr val="tx1"/>
-                </a:solidFill>
-              </a:rPr>
-              <a:t>Barcharts</a:t>
-            </a:r>
-            <a:r>
               <a:rPr lang="en-US" dirty="0">
                 <a:solidFill>
                   <a:schemeClr val="tx1"/>
                 </a:solidFill>
               </a:rPr>
-              <a:t> used to visualize nominal features with a single category &gt; 80% occurrence</a:t>
+              <a:t>Bar charts used to visualize nominal features with a single category &gt; 80% occurrence</a:t>
             </a:r>
           </a:p>
           <a:p>
@@ -5519,20 +5608,12 @@
               <a:buChar char="•"/>
             </a:pPr>
             <a:r>
-              <a:rPr lang="en-US" dirty="0" err="1">
-                <a:solidFill>
-                  <a:schemeClr val="tx1"/>
-                </a:solidFill>
-              </a:rPr>
-              <a:t>Barcharts</a:t>
-            </a:r>
-            <a:r>
               <a:rPr lang="en-US" dirty="0">
                 <a:solidFill>
                   <a:schemeClr val="tx1"/>
                 </a:solidFill>
               </a:rPr>
-              <a:t> used to visualize ordinal features with a single category &gt; 80% occurrence</a:t>
+              <a:t>Bar charts used to visualize ordinal features with a single category &gt; 80% occurrence</a:t>
             </a:r>
           </a:p>
           <a:p>
@@ -5546,7 +5627,7 @@
                   <a:schemeClr val="tx1"/>
                 </a:solidFill>
               </a:rPr>
-              <a:t> Reduced to 11 ordinal features</a:t>
+              <a:t>Reduced to 11 ordinal features</a:t>
             </a:r>
           </a:p>
         </p:txBody>
@@ -5710,20 +5791,12 @@
               <a:buChar char="•"/>
             </a:pPr>
             <a:r>
-              <a:rPr lang="en-US" dirty="0" err="1">
-                <a:solidFill>
-                  <a:schemeClr val="tx1"/>
-                </a:solidFill>
-              </a:rPr>
-              <a:t>Pairplots</a:t>
-            </a:r>
-            <a:r>
               <a:rPr lang="en-US" dirty="0">
                 <a:solidFill>
                   <a:schemeClr val="tx1"/>
                 </a:solidFill>
               </a:rPr>
-              <a:t> are used to find the correlation for ordinal features after converted to numerical values</a:t>
+              <a:t>Pair plots are used to find the correlation for ordinal features after converted to numerical values</a:t>
             </a:r>
           </a:p>
           <a:p>
@@ -5737,7 +5810,7 @@
                   <a:schemeClr val="tx1"/>
                 </a:solidFill>
               </a:rPr>
-              <a:t> Reduced to 5 ordinal features</a:t>
+              <a:t>Further reduced to 5 ordinal features</a:t>
             </a:r>
           </a:p>
         </p:txBody>
@@ -6523,7 +6596,7 @@
             <a:pPr algn="ctr"/>
             <a:r>
               <a:rPr lang="en-US" sz="1000" i="1" dirty="0"/>
-              <a:t>Table 1. RSME for different regression models</a:t>
+              <a:t>Table 1. Table of comparison for different regression models</a:t>
             </a:r>
           </a:p>
           <a:p>

</xml_diff>